<commit_message>
Update column names from physical quantity to measurand
</commit_message>
<xml_diff>
--- a/figures/Ex Fig 8.pptx
+++ b/figures/Ex Fig 8.pptx
@@ -8,8 +8,8 @@
     <p:notesMasterId r:id="rId4"/>
   </p:notesMasterIdLst>
   <p:sldIdLst>
-    <p:sldId id="260" r:id="rId2"/>
-    <p:sldId id="261" r:id="rId3"/>
+    <p:sldId id="261" r:id="rId2"/>
+    <p:sldId id="260" r:id="rId3"/>
   </p:sldIdLst>
   <p:sldSz cx="13320713" cy="8999538"/>
   <p:notesSz cx="6858000" cy="9144000"/>
@@ -544,7 +544,7 @@
     </p:spTree>
     <p:extLst>
       <p:ext uri="{BB962C8B-B14F-4D97-AF65-F5344CB8AC3E}">
-        <p14:creationId xmlns:p14="http://schemas.microsoft.com/office/powerpoint/2010/main" val="2848176150"/>
+        <p14:creationId xmlns:p14="http://schemas.microsoft.com/office/powerpoint/2010/main" val="863955766"/>
       </p:ext>
     </p:extLst>
   </p:cSld>
@@ -633,7 +633,7 @@
     </p:spTree>
     <p:extLst>
       <p:ext uri="{BB962C8B-B14F-4D97-AF65-F5344CB8AC3E}">
-        <p14:creationId xmlns:p14="http://schemas.microsoft.com/office/powerpoint/2010/main" val="863955766"/>
+        <p14:creationId xmlns:p14="http://schemas.microsoft.com/office/powerpoint/2010/main" val="2848176150"/>
       </p:ext>
     </p:extLst>
   </p:cSld>
@@ -3520,12 +3520,12 @@
         </p:nvPicPr>
         <p:blipFill>
           <a:blip r:embed="rId3"/>
-          <a:srcRect t="3591" b="1"/>
+          <a:srcRect t="1796" b="1796"/>
           <a:stretch/>
         </p:blipFill>
         <p:spPr>
           <a:xfrm>
-            <a:off x="1260356" y="1894998"/>
+            <a:off x="1260356" y="1880484"/>
             <a:ext cx="10800000" cy="2863345"/>
           </a:xfrm>
           <a:prstGeom prst="rect">
@@ -3549,13 +3549,13 @@
         </p:nvPicPr>
         <p:blipFill>
           <a:blip r:embed="rId4"/>
-          <a:srcRect t="11385"/>
+          <a:srcRect t="15757" b="5693"/>
           <a:stretch/>
         </p:blipFill>
         <p:spPr>
           <a:xfrm>
-            <a:off x="1138161" y="4855527"/>
-            <a:ext cx="10958980" cy="2670594"/>
+            <a:off x="0" y="4877793"/>
+            <a:ext cx="12097141" cy="2613170"/>
           </a:xfrm>
           <a:prstGeom prst="rect">
             <a:avLst/>
@@ -3955,7 +3955,7 @@
     </p:spTree>
     <p:extLst>
       <p:ext uri="{BB962C8B-B14F-4D97-AF65-F5344CB8AC3E}">
-        <p14:creationId xmlns:p14="http://schemas.microsoft.com/office/powerpoint/2010/main" val="4274700107"/>
+        <p14:creationId xmlns:p14="http://schemas.microsoft.com/office/powerpoint/2010/main" val="1276920188"/>
       </p:ext>
     </p:extLst>
   </p:cSld>
@@ -3998,12 +3998,12 @@
         </p:nvPicPr>
         <p:blipFill>
           <a:blip r:embed="rId3"/>
-          <a:srcRect t="3591" b="1"/>
+          <a:srcRect t="1796" b="1796"/>
           <a:stretch/>
         </p:blipFill>
         <p:spPr>
           <a:xfrm>
-            <a:off x="1260356" y="1894998"/>
+            <a:off x="1260356" y="1880484"/>
             <a:ext cx="10800000" cy="2863345"/>
           </a:xfrm>
           <a:prstGeom prst="rect">
@@ -4027,13 +4027,13 @@
         </p:nvPicPr>
         <p:blipFill>
           <a:blip r:embed="rId4"/>
-          <a:srcRect t="15757" b="5693"/>
+          <a:srcRect t="11385"/>
           <a:stretch/>
         </p:blipFill>
         <p:spPr>
           <a:xfrm>
-            <a:off x="0" y="4877793"/>
-            <a:ext cx="12097141" cy="2613170"/>
+            <a:off x="1138161" y="4855527"/>
+            <a:ext cx="10958980" cy="2670594"/>
           </a:xfrm>
           <a:prstGeom prst="rect">
             <a:avLst/>
@@ -4433,7 +4433,7 @@
     </p:spTree>
     <p:extLst>
       <p:ext uri="{BB962C8B-B14F-4D97-AF65-F5344CB8AC3E}">
-        <p14:creationId xmlns:p14="http://schemas.microsoft.com/office/powerpoint/2010/main" val="1276920188"/>
+        <p14:creationId xmlns:p14="http://schemas.microsoft.com/office/powerpoint/2010/main" val="4274700107"/>
       </p:ext>
     </p:extLst>
   </p:cSld>

</xml_diff>